<commit_message>
Fix some font sizes and colors
</commit_message>
<xml_diff>
--- a/Präsentationen/Python Einführung.pptx
+++ b/Präsentationen/Python Einführung.pptx
@@ -412,7 +412,7 @@
                   <a:schemeClr val="tx2"/>
                 </a:solidFill>
               </a:rPr>
-              <a:t>27.03.2018</a:t>
+              <a:t>07.09.2018</a:t>
             </a:fld>
             <a:endParaRPr lang="de-DE">
               <a:solidFill>
@@ -762,7 +762,7 @@
             <a:fld id="{B4113CCE-1A1A-46DB-884A-AE560F65C3AF}" type="datetimeFigureOut">
               <a:rPr lang="de-DE" smtClean="0"/>
               <a:pPr/>
-              <a:t>27.03.2018</a:t>
+              <a:t>07.09.2018</a:t>
             </a:fld>
             <a:endParaRPr lang="de-DE"/>
           </a:p>
@@ -1358,7 +1358,10 @@
           <a:bodyPr/>
           <a:lstStyle/>
           <a:p>
-            <a:endParaRPr lang="de-DE" dirty="0"/>
+            <a:r>
+              <a:rPr lang="de-DE" dirty="0" smtClean="0"/>
+              <a:t>TODO: Screenshot verbessern: es sieht so aus, als würde die Liste ggf. sortiert. Das ist nicht der Fall.</a:t>
+            </a:r>
           </a:p>
         </p:txBody>
       </p:sp>
@@ -4610,7 +4613,7 @@
           <a:p>
             <a:fld id="{B629FF5D-C1A5-48C8-8545-07B501EE72D4}" type="datetime1">
               <a:rPr lang="de-DE" smtClean="0"/>
-              <a:t>27.03.2018</a:t>
+              <a:t>07.09.2018</a:t>
             </a:fld>
             <a:endParaRPr lang="de-DE"/>
           </a:p>
@@ -4795,7 +4798,7 @@
           <a:p>
             <a:fld id="{8C4C0ABC-76E8-4FF4-86A8-DEC3D511F3B2}" type="datetime1">
               <a:rPr lang="de-DE" smtClean="0"/>
-              <a:t>27.03.2018</a:t>
+              <a:t>07.09.2018</a:t>
             </a:fld>
             <a:endParaRPr lang="de-DE"/>
           </a:p>
@@ -4952,7 +4955,7 @@
           <a:p>
             <a:fld id="{E187AA6A-184D-40F7-A482-E244A841FFB7}" type="datetime1">
               <a:rPr lang="de-DE" smtClean="0"/>
-              <a:t>27.03.2018</a:t>
+              <a:t>07.09.2018</a:t>
             </a:fld>
             <a:endParaRPr lang="de-DE"/>
           </a:p>
@@ -5219,7 +5222,7 @@
           <a:p>
             <a:fld id="{EF4D3471-921C-4F2B-95F2-45CF9F80E55E}" type="datetime1">
               <a:rPr lang="de-DE" smtClean="0"/>
-              <a:t>27.03.2018</a:t>
+              <a:t>07.09.2018</a:t>
             </a:fld>
             <a:endParaRPr lang="de-DE"/>
           </a:p>
@@ -5400,7 +5403,7 @@
           <a:p>
             <a:fld id="{98DD8D00-4265-43DF-9C4A-DE9BEC1EA000}" type="datetime1">
               <a:rPr lang="de-DE" smtClean="0"/>
-              <a:t>27.03.2018</a:t>
+              <a:t>07.09.2018</a:t>
             </a:fld>
             <a:endParaRPr lang="de-DE"/>
           </a:p>
@@ -5529,7 +5532,7 @@
           <a:p>
             <a:fld id="{B2FF20D5-ABA5-4FD3-B0E4-58D845B14A52}" type="datetime1">
               <a:rPr lang="de-DE" smtClean="0"/>
-              <a:t>27.03.2018</a:t>
+              <a:t>07.09.2018</a:t>
             </a:fld>
             <a:endParaRPr lang="de-DE"/>
           </a:p>
@@ -5635,7 +5638,7 @@
           <a:p>
             <a:fld id="{1BFEE2EF-8B70-47BE-8C03-E08F3A67F2E6}" type="datetime1">
               <a:rPr lang="de-DE" smtClean="0"/>
-              <a:t>27.03.2018</a:t>
+              <a:t>07.09.2018</a:t>
             </a:fld>
             <a:endParaRPr lang="de-DE"/>
           </a:p>
@@ -5768,7 +5771,7 @@
           <a:p>
             <a:fld id="{CDF945CE-5888-4C05-BE25-1B858D440F1B}" type="datetime1">
               <a:rPr lang="de-DE" smtClean="0"/>
-              <a:t>27.03.2018</a:t>
+              <a:t>07.09.2018</a:t>
             </a:fld>
             <a:endParaRPr lang="de-DE"/>
           </a:p>
@@ -5951,7 +5954,7 @@
           <a:p>
             <a:fld id="{A82F6A88-870F-42E1-80C8-044E8549C5CE}" type="datetime1">
               <a:rPr lang="de-DE" smtClean="0"/>
-              <a:t>27.03.2018</a:t>
+              <a:t>07.09.2018</a:t>
             </a:fld>
             <a:endParaRPr lang="de-DE" dirty="0"/>
           </a:p>
@@ -6142,7 +6145,7 @@
           <a:p>
             <a:fld id="{93E9CE4B-3359-4535-8239-A69CF3DCEA4F}" type="datetime1">
               <a:rPr lang="de-DE" smtClean="0"/>
-              <a:t>27.03.2018</a:t>
+              <a:t>07.09.2018</a:t>
             </a:fld>
             <a:endParaRPr lang="de-DE"/>
           </a:p>
@@ -6351,7 +6354,7 @@
           <a:p>
             <a:fld id="{35926458-0D16-4690-8BEF-D69D90335FEC}" type="datetime1">
               <a:rPr lang="de-DE" smtClean="0"/>
-              <a:t>27.03.2018</a:t>
+              <a:t>07.09.2018</a:t>
             </a:fld>
             <a:endParaRPr lang="de-DE"/>
           </a:p>
@@ -6776,7 +6779,7 @@
           <a:p>
             <a:fld id="{ED031EB9-BFFC-4756-816A-B229AB007552}" type="datetime1">
               <a:rPr lang="de-DE" smtClean="0"/>
-              <a:t>27.03.2018</a:t>
+              <a:t>07.09.2018</a:t>
             </a:fld>
             <a:endParaRPr lang="de-DE" dirty="0"/>
           </a:p>
@@ -7360,7 +7363,7 @@
           <a:p>
             <a:fld id="{A82F6A88-870F-42E1-80C8-044E8549C5CE}" type="datetime1">
               <a:rPr lang="de-DE" smtClean="0"/>
-              <a:t>27.03.2018</a:t>
+              <a:t>07.09.2018</a:t>
             </a:fld>
             <a:endParaRPr lang="de-DE" dirty="0"/>
           </a:p>
@@ -8000,7 +8003,7 @@
           <a:p>
             <a:fld id="{CE0EB4A9-3129-4D94-9276-6EFCF725FEB5}" type="datetime1">
               <a:rPr lang="de-DE" smtClean="0"/>
-              <a:t>27.03.2018</a:t>
+              <a:t>07.09.2018</a:t>
             </a:fld>
             <a:endParaRPr lang="de-DE"/>
           </a:p>
@@ -8204,7 +8207,7 @@
           <a:p>
             <a:fld id="{92A8BBDF-07DD-4D85-AA35-D770B117BEF8}" type="datetime1">
               <a:rPr lang="de-DE" smtClean="0"/>
-              <a:t>27.03.2018</a:t>
+              <a:t>07.09.2018</a:t>
             </a:fld>
             <a:endParaRPr lang="de-DE"/>
           </a:p>
@@ -8444,7 +8447,7 @@
           <a:p>
             <a:fld id="{32A94186-FFAA-4919-B83F-24FAACFCEBBE}" type="datetime1">
               <a:rPr lang="de-DE" smtClean="0"/>
-              <a:t>27.03.2018</a:t>
+              <a:t>07.09.2018</a:t>
             </a:fld>
             <a:endParaRPr lang="de-DE"/>
           </a:p>
@@ -8657,22 +8660,14 @@
           <a:p>
             <a:r>
               <a:rPr lang="de-DE" sz="2400" dirty="0" smtClean="0"/>
-              <a:t>Benötigte </a:t>
-            </a:r>
-            <a:r>
-              <a:rPr lang="de-DE" sz="2400" dirty="0" smtClean="0"/>
-              <a:t>Programme</a:t>
+              <a:t>Benötigte Programme</a:t>
             </a:r>
           </a:p>
           <a:p>
             <a:pPr lvl="1"/>
             <a:r>
               <a:rPr lang="de-DE" sz="2000" dirty="0" smtClean="0"/>
-              <a:t>Schreiben</a:t>
-            </a:r>
-            <a:r>
-              <a:rPr lang="de-DE" sz="2000" dirty="0" smtClean="0"/>
-              <a:t>: Editor („Notepad“)</a:t>
+              <a:t>Schreiben: Editor („Notepad“)</a:t>
             </a:r>
           </a:p>
           <a:p>
@@ -8686,33 +8681,21 @@
             <a:pPr lvl="2"/>
             <a:r>
               <a:rPr lang="de-DE" sz="1800" dirty="0" smtClean="0"/>
-              <a:t>Liste </a:t>
-            </a:r>
+              <a:t>Liste von möglichen Befehlen?</a:t>
+            </a:r>
+          </a:p>
+          <a:p>
+            <a:pPr lvl="1"/>
+            <a:r>
+              <a:rPr lang="de-DE" sz="2000" dirty="0" smtClean="0"/>
+              <a:t>Übersetzen: Compiler / Interpreter</a:t>
+            </a:r>
+          </a:p>
+          <a:p>
+            <a:pPr lvl="2"/>
             <a:r>
               <a:rPr lang="de-DE" sz="1800" dirty="0" smtClean="0"/>
-              <a:t>von möglichen Befehlen?</a:t>
-            </a:r>
-          </a:p>
-          <a:p>
-            <a:pPr lvl="1"/>
-            <a:r>
-              <a:rPr lang="de-DE" sz="2000" dirty="0" smtClean="0"/>
-              <a:t>Übersetzen</a:t>
-            </a:r>
-            <a:r>
-              <a:rPr lang="de-DE" sz="2000" dirty="0" smtClean="0"/>
-              <a:t>: Compiler / Interpreter</a:t>
-            </a:r>
-          </a:p>
-          <a:p>
-            <a:pPr lvl="2"/>
-            <a:r>
-              <a:rPr lang="de-DE" sz="1800" dirty="0" smtClean="0"/>
-              <a:t>Fehler finden</a:t>
-            </a:r>
-            <a:r>
-              <a:rPr lang="de-DE" sz="1800" dirty="0" smtClean="0"/>
-              <a:t>?</a:t>
+              <a:t>Fehler finden?</a:t>
             </a:r>
           </a:p>
           <a:p>
@@ -8741,7 +8724,6 @@
               <a:rPr lang="de-DE" sz="2600" dirty="0" smtClean="0"/>
               <a:t>Lösung: IDE = Integrated Development Environment</a:t>
             </a:r>
-            <a:endParaRPr lang="de-DE" sz="2600" dirty="0" smtClean="0"/>
           </a:p>
           <a:p>
             <a:pPr lvl="2"/>
@@ -8766,7 +8748,7 @@
           <a:p>
             <a:fld id="{83468713-7584-40CF-B812-011DDBE4027E}" type="datetime1">
               <a:rPr lang="de-DE" smtClean="0"/>
-              <a:t>27.03.2018</a:t>
+              <a:t>07.09.2018</a:t>
             </a:fld>
             <a:endParaRPr lang="de-DE"/>
           </a:p>
@@ -8931,15 +8913,7 @@
           <a:p>
             <a:r>
               <a:rPr lang="de-DE" dirty="0" smtClean="0"/>
-              <a:t>Bereits </a:t>
-            </a:r>
-            <a:r>
-              <a:rPr lang="de-DE" dirty="0" smtClean="0"/>
-              <a:t>installiert: </a:t>
-            </a:r>
-            <a:r>
-              <a:rPr lang="de-DE" dirty="0" smtClean="0"/>
-              <a:t>IDLE</a:t>
+              <a:t>Bereits installiert: IDLE</a:t>
             </a:r>
           </a:p>
           <a:p>
@@ -8955,16 +8929,11 @@
               <a:rPr lang="de-DE" dirty="0" smtClean="0"/>
               <a:t>viele Fenster</a:t>
             </a:r>
-            <a:endParaRPr lang="de-DE" dirty="0" smtClean="0"/>
-          </a:p>
-          <a:p>
-            <a:r>
-              <a:rPr lang="de-DE" dirty="0" smtClean="0"/>
-              <a:t>Besser</a:t>
-            </a:r>
-            <a:r>
-              <a:rPr lang="de-DE" dirty="0" smtClean="0"/>
-              <a:t>: </a:t>
+          </a:p>
+          <a:p>
+            <a:r>
+              <a:rPr lang="de-DE" dirty="0" smtClean="0"/>
+              <a:t>Besser: </a:t>
             </a:r>
             <a:r>
               <a:rPr lang="de-DE" dirty="0" err="1" smtClean="0"/>
@@ -8978,7 +8947,6 @@
               <a:rPr lang="de-DE" dirty="0" smtClean="0"/>
               <a:t>Kostenlos verfügbar</a:t>
             </a:r>
-            <a:endParaRPr lang="de-DE" dirty="0" smtClean="0"/>
           </a:p>
         </p:txBody>
       </p:sp>
@@ -8999,7 +8967,7 @@
           <a:p>
             <a:fld id="{A593EC17-1A47-412F-8CE6-B549CABBD4A8}" type="datetime1">
               <a:rPr lang="de-DE" smtClean="0"/>
-              <a:t>27.03.2018</a:t>
+              <a:t>07.09.2018</a:t>
             </a:fld>
             <a:endParaRPr lang="de-DE"/>
           </a:p>
@@ -9199,7 +9167,7 @@
           <a:p>
             <a:fld id="{3EFE85D8-2AAB-493B-BF38-280230E506B2}" type="datetime1">
               <a:rPr lang="de-DE" smtClean="0"/>
-              <a:t>27.03.2018</a:t>
+              <a:t>07.09.2018</a:t>
             </a:fld>
             <a:endParaRPr lang="de-DE"/>
           </a:p>
@@ -9438,13 +9406,8 @@
           <a:p>
             <a:r>
               <a:rPr lang="de-DE" dirty="0" smtClean="0"/>
-              <a:t>ohne </a:t>
-            </a:r>
-            <a:r>
-              <a:rPr lang="de-DE" dirty="0" smtClean="0"/>
-              <a:t>Debugger</a:t>
-            </a:r>
-            <a:endParaRPr lang="de-DE" dirty="0" smtClean="0"/>
+              <a:t>ohne Debugger</a:t>
+            </a:r>
           </a:p>
         </p:txBody>
       </p:sp>
@@ -9465,7 +9428,7 @@
           <a:p>
             <a:fld id="{1F15A383-2A7D-442F-A80A-F698B5F779ED}" type="datetime1">
               <a:rPr lang="de-DE" smtClean="0"/>
-              <a:t>27.03.2018</a:t>
+              <a:t>07.09.2018</a:t>
             </a:fld>
             <a:endParaRPr lang="de-DE"/>
           </a:p>
@@ -9671,11 +9634,7 @@
           <a:p>
             <a:r>
               <a:rPr lang="de-DE" dirty="0" smtClean="0"/>
-              <a:t>Python </a:t>
-            </a:r>
-            <a:r>
-              <a:rPr lang="de-DE" dirty="0" smtClean="0"/>
-              <a:t>Tutor</a:t>
+              <a:t>Python Tutor</a:t>
             </a:r>
           </a:p>
           <a:p>
@@ -9726,7 +9685,7 @@
           <a:p>
             <a:fld id="{17A47A22-FB29-4A9E-B830-EB8CE7EF8B44}" type="datetime1">
               <a:rPr lang="de-DE" smtClean="0"/>
-              <a:t>27.03.2018</a:t>
+              <a:t>07.09.2018</a:t>
             </a:fld>
             <a:endParaRPr lang="de-DE"/>
           </a:p>
@@ -9973,7 +9932,7 @@
           <a:p>
             <a:fld id="{249F8F50-D413-4C42-B728-AB71DB385A94}" type="datetime1">
               <a:rPr lang="de-DE" smtClean="0"/>
-              <a:t>27.03.2018</a:t>
+              <a:t>07.09.2018</a:t>
             </a:fld>
             <a:endParaRPr lang="de-DE"/>
           </a:p>
@@ -10275,7 +10234,7 @@
           <a:p>
             <a:fld id="{7F662C5E-2FD1-46D7-BED1-038091AD8DAE}" type="datetime1">
               <a:rPr lang="de-DE" smtClean="0"/>
-              <a:t>27.03.2018</a:t>
+              <a:t>07.09.2018</a:t>
             </a:fld>
             <a:endParaRPr lang="de-DE"/>
           </a:p>
@@ -10391,11 +10350,7 @@
           <a:p>
             <a:r>
               <a:rPr lang="de-DE" dirty="0" smtClean="0"/>
-              <a:t>Python </a:t>
-            </a:r>
-            <a:r>
-              <a:rPr lang="de-DE" dirty="0" smtClean="0"/>
-              <a:t>Grundlagen</a:t>
+              <a:t>Python Grundlagen</a:t>
             </a:r>
             <a:r>
               <a:rPr lang="de-DE" dirty="0"/>
@@ -10460,13 +10415,8 @@
             <a:pPr lvl="1"/>
             <a:r>
               <a:rPr lang="de-DE" dirty="0" smtClean="0"/>
-              <a:t>Textdatei mit UTF-8 </a:t>
-            </a:r>
-            <a:r>
-              <a:rPr lang="de-DE" dirty="0" smtClean="0"/>
-              <a:t>Encoding</a:t>
-            </a:r>
-            <a:endParaRPr lang="de-DE" dirty="0" smtClean="0"/>
+              <a:t>Textdatei mit UTF-8 Encoding</a:t>
+            </a:r>
           </a:p>
           <a:p>
             <a:r>
@@ -10502,13 +10452,8 @@
             <a:pPr lvl="1"/>
             <a:r>
               <a:rPr lang="de-DE" dirty="0" smtClean="0"/>
-              <a:t>bei anderen Sprachen oft </a:t>
-            </a:r>
-            <a:r>
-              <a:rPr lang="de-DE" dirty="0" smtClean="0"/>
-              <a:t>egal</a:t>
-            </a:r>
-            <a:endParaRPr lang="de-DE" dirty="0" smtClean="0"/>
+              <a:t>bei anderen Sprachen oft egal</a:t>
+            </a:r>
           </a:p>
           <a:p>
             <a:r>
@@ -10543,7 +10488,7 @@
           <a:p>
             <a:fld id="{4447688E-1776-4428-B0A5-F175CECF7938}" type="datetime1">
               <a:rPr lang="de-DE" smtClean="0"/>
-              <a:t>27.03.2018</a:t>
+              <a:t>07.09.2018</a:t>
             </a:fld>
             <a:endParaRPr lang="de-DE"/>
           </a:p>
@@ -10733,7 +10678,7 @@
           <a:p>
             <a:fld id="{0E7DC1E0-BDA5-44C8-9CB7-0226ECCB4287}" type="datetime1">
               <a:rPr lang="de-DE" smtClean="0"/>
-              <a:t>27.03.2018</a:t>
+              <a:t>07.09.2018</a:t>
             </a:fld>
             <a:endParaRPr lang="de-DE"/>
           </a:p>
@@ -10849,11 +10794,7 @@
           <a:p>
             <a:r>
               <a:rPr lang="de-DE" dirty="0" smtClean="0"/>
-              <a:t>Python </a:t>
-            </a:r>
-            <a:r>
-              <a:rPr lang="de-DE" dirty="0" smtClean="0"/>
-              <a:t>Grundlagen</a:t>
+              <a:t>Python Grundlagen</a:t>
             </a:r>
             <a:r>
               <a:rPr lang="de-DE" dirty="0"/>
@@ -10911,14 +10852,6 @@
               </a:rPr>
               <a:t>#</a:t>
             </a:r>
-            <a:endParaRPr lang="de-DE" b="1" dirty="0" smtClean="0">
-              <a:solidFill>
-                <a:schemeClr val="accent1">
-                  <a:lumMod val="75000"/>
-                </a:schemeClr>
-              </a:solidFill>
-              <a:ea typeface="+mj-ea"/>
-            </a:endParaRPr>
           </a:p>
         </p:txBody>
       </p:sp>
@@ -10939,7 +10872,7 @@
           <a:p>
             <a:fld id="{56B33E50-8FD2-4CEE-972A-D49A363CE77B}" type="datetime1">
               <a:rPr lang="de-DE" smtClean="0"/>
-              <a:t>27.03.2018</a:t>
+              <a:t>07.09.2018</a:t>
             </a:fld>
             <a:endParaRPr lang="de-DE"/>
           </a:p>
@@ -11091,11 +11024,7 @@
           <a:p>
             <a:r>
               <a:rPr lang="de-DE" dirty="0" smtClean="0"/>
-              <a:t>Python </a:t>
-            </a:r>
-            <a:r>
-              <a:rPr lang="de-DE" dirty="0" smtClean="0"/>
-              <a:t>Grundlagen</a:t>
+              <a:t>Python Grundlagen</a:t>
             </a:r>
             <a:r>
               <a:rPr lang="de-DE" dirty="0"/>
@@ -11142,13 +11071,7 @@
               <a:rPr lang="de-DE" dirty="0" smtClean="0">
                 <a:ea typeface="+mj-ea"/>
               </a:rPr>
-              <a:t>Zuweisung </a:t>
-            </a:r>
-            <a:r>
-              <a:rPr lang="de-DE" dirty="0" smtClean="0">
-                <a:ea typeface="+mj-ea"/>
-              </a:rPr>
-              <a:t>eines Werts mit </a:t>
+              <a:t>Zuweisung eines Werts mit </a:t>
             </a:r>
             <a:r>
               <a:rPr lang="de-DE" sz="3200" b="1" dirty="0">
@@ -11173,19 +11096,7 @@
               <a:rPr lang="de-DE" dirty="0" smtClean="0">
                 <a:ea typeface="+mj-ea"/>
               </a:rPr>
-              <a:t>athematische </a:t>
-            </a:r>
-            <a:r>
-              <a:rPr lang="de-DE" dirty="0" smtClean="0">
-                <a:ea typeface="+mj-ea"/>
-              </a:rPr>
-              <a:t>Operationen </a:t>
-            </a:r>
-            <a:r>
-              <a:rPr lang="de-DE" dirty="0" smtClean="0">
-                <a:ea typeface="+mj-ea"/>
-              </a:rPr>
-              <a:t>mit </a:t>
+              <a:t>athematische Operationen mit </a:t>
             </a:r>
             <a:r>
               <a:rPr lang="de-DE" sz="3200" b="1" dirty="0" smtClean="0">
@@ -11299,7 +11210,7 @@
           <a:p>
             <a:fld id="{C1A449D8-E3B9-4E0B-9A9A-61F4E8B35412}" type="datetime1">
               <a:rPr lang="de-DE" smtClean="0"/>
-              <a:t>27.03.2018</a:t>
+              <a:t>07.09.2018</a:t>
             </a:fld>
             <a:endParaRPr lang="de-DE"/>
           </a:p>
@@ -11451,11 +11362,7 @@
           <a:p>
             <a:r>
               <a:rPr lang="de-DE" dirty="0" smtClean="0"/>
-              <a:t>Python </a:t>
-            </a:r>
-            <a:r>
-              <a:rPr lang="de-DE" dirty="0" smtClean="0"/>
-              <a:t>Grundlagen</a:t>
+              <a:t>Python Grundlagen</a:t>
             </a:r>
             <a:r>
               <a:rPr lang="de-DE" dirty="0"/>
@@ -11666,7 +11573,7 @@
           <a:p>
             <a:fld id="{1EC4E88F-121A-4BCB-BF0E-D3797C910E03}" type="datetime1">
               <a:rPr lang="de-DE" smtClean="0"/>
-              <a:t>27.03.2018</a:t>
+              <a:t>07.09.2018</a:t>
             </a:fld>
             <a:endParaRPr lang="de-DE"/>
           </a:p>
@@ -11818,11 +11725,7 @@
           <a:p>
             <a:r>
               <a:rPr lang="de-DE" dirty="0" smtClean="0"/>
-              <a:t>Python </a:t>
-            </a:r>
-            <a:r>
-              <a:rPr lang="de-DE" dirty="0" smtClean="0"/>
-              <a:t>Grundlagen</a:t>
+              <a:t>Python Grundlagen</a:t>
             </a:r>
             <a:r>
               <a:rPr lang="de-DE" dirty="0"/>
@@ -12080,7 +11983,7 @@
               <a:t>ddition/</a:t>
             </a:r>
             <a:r>
-              <a:rPr lang="de-DE" sz="2800" dirty="0">
+              <a:rPr lang="de-DE" sz="2800" b="1" dirty="0">
                 <a:solidFill>
                   <a:schemeClr val="accent1">
                     <a:lumMod val="75000"/>
@@ -12133,7 +12036,7 @@
           <a:p>
             <a:fld id="{A8654AF1-82C6-4ADC-A7F2-B4AEE1A98348}" type="datetime1">
               <a:rPr lang="de-DE" smtClean="0"/>
-              <a:t>27.03.2018</a:t>
+              <a:t>07.09.2018</a:t>
             </a:fld>
             <a:endParaRPr lang="de-DE"/>
           </a:p>
@@ -12285,11 +12188,7 @@
           <a:p>
             <a:r>
               <a:rPr lang="de-DE" dirty="0" smtClean="0"/>
-              <a:t>Python </a:t>
-            </a:r>
-            <a:r>
-              <a:rPr lang="de-DE" dirty="0" smtClean="0"/>
-              <a:t>Grundlagen</a:t>
+              <a:t>Python Grundlagen</a:t>
             </a:r>
             <a:r>
               <a:rPr lang="de-DE" dirty="0"/>
@@ -12467,7 +12366,13 @@
                 </a:solidFill>
                 <a:ea typeface="+mj-ea"/>
               </a:rPr>
-              <a:t>**=,</a:t>
+              <a:t>**=</a:t>
+            </a:r>
+            <a:r>
+              <a:rPr lang="de-DE" sz="2800" dirty="0">
+                <a:ea typeface="+mj-ea"/>
+              </a:rPr>
+              <a:t>,</a:t>
             </a:r>
             <a:r>
               <a:rPr lang="de-DE" dirty="0" smtClean="0"/>
@@ -12482,7 +12387,13 @@
                 </a:solidFill>
                 <a:ea typeface="+mj-ea"/>
               </a:rPr>
-              <a:t>%=,</a:t>
+              <a:t>%=</a:t>
+            </a:r>
+            <a:r>
+              <a:rPr lang="de-DE" sz="2800" dirty="0">
+                <a:ea typeface="+mj-ea"/>
+              </a:rPr>
+              <a:t>,</a:t>
             </a:r>
             <a:r>
               <a:rPr lang="de-DE" dirty="0" smtClean="0"/>
@@ -12519,7 +12430,7 @@
           <a:p>
             <a:fld id="{ACD76AD2-EB50-4CAA-B749-1CA7AD92AF96}" type="datetime1">
               <a:rPr lang="de-DE" smtClean="0"/>
-              <a:t>27.03.2018</a:t>
+              <a:t>07.09.2018</a:t>
             </a:fld>
             <a:endParaRPr lang="de-DE"/>
           </a:p>
@@ -12637,10 +12548,6 @@
               <a:rPr lang="de-DE" dirty="0" smtClean="0"/>
               <a:t>Python Grundlagen</a:t>
             </a:r>
-            <a:r>
-              <a:rPr lang="de-DE" dirty="0" smtClean="0"/>
-              <a:t/>
-            </a:r>
             <a:br>
               <a:rPr lang="de-DE" dirty="0" smtClean="0"/>
             </a:br>
@@ -12670,7 +12577,7 @@
             <a:fld id="{01FACE75-9AC0-4AFD-B75F-251826FD2CBC}" type="datetime1">
               <a:rPr lang="de-DE" smtClean="0"/>
               <a:pPr/>
-              <a:t>27.03.2018</a:t>
+              <a:t>07.09.2018</a:t>
             </a:fld>
             <a:endParaRPr lang="de-DE"/>
           </a:p>
@@ -12763,18 +12670,15 @@
               <a:rPr lang="de-DE" sz="2400" dirty="0" smtClean="0">
                 <a:ea typeface="+mj-ea"/>
               </a:rPr>
-              <a:t>356</a:t>
+              <a:t>356 </a:t>
             </a:r>
             <a:r>
               <a:rPr lang="de-DE" sz="2400" dirty="0" smtClean="0">
-                <a:solidFill>
-                  <a:schemeClr val="accent1">
-                    <a:lumMod val="75000"/>
-                  </a:schemeClr>
-                </a:solidFill>
+                <a:latin typeface="Segoe UI" panose="020B0502040204020203" pitchFamily="34" charset="0"/>
                 <a:ea typeface="+mj-ea"/>
-              </a:rPr>
-              <a:t>x</a:t>
+                <a:cs typeface="Segoe UI" panose="020B0502040204020203" pitchFamily="34" charset="0"/>
+              </a:rPr>
+              <a:t>∙ </a:t>
             </a:r>
             <a:r>
               <a:rPr lang="de-DE" sz="2400" dirty="0" smtClean="0">
@@ -12858,11 +12762,7 @@
           <a:p>
             <a:r>
               <a:rPr lang="de-DE" dirty="0" smtClean="0"/>
-              <a:t>Python </a:t>
-            </a:r>
-            <a:r>
-              <a:rPr lang="de-DE" dirty="0" smtClean="0"/>
-              <a:t>Grundlagen</a:t>
+              <a:t>Python Grundlagen</a:t>
             </a:r>
             <a:r>
               <a:rPr lang="de-DE" dirty="0"/>
@@ -12907,11 +12807,7 @@
           <a:p>
             <a:r>
               <a:rPr lang="de-DE" dirty="0" smtClean="0"/>
-              <a:t>auch: Zeichenketten</a:t>
-            </a:r>
-            <a:r>
-              <a:rPr lang="de-DE" dirty="0" smtClean="0"/>
-              <a:t>, Strings</a:t>
+              <a:t>auch: Zeichenketten, Strings</a:t>
             </a:r>
           </a:p>
           <a:p>
@@ -13041,7 +12937,7 @@
           <a:p>
             <a:fld id="{1C7419EF-796B-42D8-AB5A-3E8CCB0ED8CB}" type="datetime1">
               <a:rPr lang="de-DE" smtClean="0"/>
-              <a:t>27.03.2018</a:t>
+              <a:t>07.09.2018</a:t>
             </a:fld>
             <a:endParaRPr lang="de-DE"/>
           </a:p>
@@ -13193,11 +13089,7 @@
           <a:p>
             <a:r>
               <a:rPr lang="de-DE" dirty="0" smtClean="0"/>
-              <a:t>Python </a:t>
-            </a:r>
-            <a:r>
-              <a:rPr lang="de-DE" dirty="0" smtClean="0"/>
-              <a:t>Grundlagen</a:t>
+              <a:t>Python Grundlagen</a:t>
             </a:r>
             <a:r>
               <a:rPr lang="de-DE" dirty="0"/>
@@ -13332,7 +13224,7 @@
           <a:p>
             <a:fld id="{212C206A-EE2D-4D5E-9C6B-9F484E460468}" type="datetime1">
               <a:rPr lang="de-DE" smtClean="0"/>
-              <a:t>27.03.2018</a:t>
+              <a:t>07.09.2018</a:t>
             </a:fld>
             <a:endParaRPr lang="de-DE"/>
           </a:p>
@@ -13520,11 +13412,7 @@
           <a:p>
             <a:r>
               <a:rPr lang="de-DE" dirty="0" smtClean="0"/>
-              <a:t>Python </a:t>
-            </a:r>
-            <a:r>
-              <a:rPr lang="de-DE" dirty="0" smtClean="0"/>
-              <a:t>Grundlagen</a:t>
+              <a:t>Python Grundlagen</a:t>
             </a:r>
             <a:r>
               <a:rPr lang="de-DE" dirty="0"/>
@@ -13569,11 +13457,7 @@
           <a:p>
             <a:r>
               <a:rPr lang="de-DE" dirty="0" smtClean="0"/>
-              <a:t>Neue </a:t>
-            </a:r>
-            <a:r>
-              <a:rPr lang="de-DE" dirty="0" smtClean="0"/>
-              <a:t>Zeile: </a:t>
+              <a:t>Neue Zeile: </a:t>
             </a:r>
             <a:r>
               <a:rPr lang="de-DE" sz="3200" b="1" dirty="0">
@@ -13724,7 +13608,7 @@
           <a:p>
             <a:fld id="{4B25BD17-D927-49E2-B452-E213A9E194A6}" type="datetime1">
               <a:rPr lang="de-DE" smtClean="0"/>
-              <a:t>27.03.2018</a:t>
+              <a:t>07.09.2018</a:t>
             </a:fld>
             <a:endParaRPr lang="de-DE"/>
           </a:p>
@@ -14001,7 +13885,7 @@
           <a:p>
             <a:fld id="{E1A6A946-6638-4186-B043-3EA9BD1D6DDA}" type="datetime1">
               <a:rPr lang="de-DE" smtClean="0"/>
-              <a:t>27.03.2018</a:t>
+              <a:t>07.09.2018</a:t>
             </a:fld>
             <a:endParaRPr lang="de-DE"/>
           </a:p>
@@ -14228,7 +14112,7 @@
           <a:p>
             <a:fld id="{C1921D34-303B-4044-A77B-A7659C9CFEF9}" type="datetime1">
               <a:rPr lang="de-DE" smtClean="0"/>
-              <a:t>27.03.2018</a:t>
+              <a:t>07.09.2018</a:t>
             </a:fld>
             <a:endParaRPr lang="de-DE"/>
           </a:p>
@@ -14646,11 +14530,7 @@
           <a:p>
             <a:r>
               <a:rPr lang="de-DE" dirty="0" smtClean="0"/>
-              <a:t>Python </a:t>
-            </a:r>
-            <a:r>
-              <a:rPr lang="de-DE" dirty="0" smtClean="0"/>
-              <a:t>Grundlagen</a:t>
+              <a:t>Python Grundlagen</a:t>
             </a:r>
             <a:r>
               <a:rPr lang="de-DE" dirty="0"/>
@@ -14762,11 +14642,7 @@
             <a:pPr lvl="1"/>
             <a:r>
               <a:rPr lang="de-DE" dirty="0" smtClean="0"/>
-              <a:t>Beginnt </a:t>
-            </a:r>
-            <a:r>
-              <a:rPr lang="de-DE" dirty="0" smtClean="0"/>
-              <a:t>(wie vieles beim PC) mit </a:t>
+              <a:t>Beginnt (wie vieles beim PC) mit </a:t>
             </a:r>
             <a:r>
               <a:rPr lang="de-DE" sz="2800" b="1" dirty="0" smtClean="0">
@@ -14844,7 +14720,7 @@
           <a:p>
             <a:fld id="{CF4085D9-06B7-4FD4-909D-1B487320FEF5}" type="datetime1">
               <a:rPr lang="de-DE" smtClean="0"/>
-              <a:t>27.03.2018</a:t>
+              <a:t>07.09.2018</a:t>
             </a:fld>
             <a:endParaRPr lang="de-DE"/>
           </a:p>
@@ -14996,11 +14872,7 @@
           <a:p>
             <a:r>
               <a:rPr lang="de-DE" dirty="0" smtClean="0"/>
-              <a:t>Python </a:t>
-            </a:r>
-            <a:r>
-              <a:rPr lang="de-DE" dirty="0" smtClean="0"/>
-              <a:t>Grundlagen</a:t>
+              <a:t>Python Grundlagen</a:t>
             </a:r>
             <a:r>
               <a:rPr lang="de-DE" dirty="0"/>
@@ -15052,34 +14924,17 @@
             <a:pPr lvl="1"/>
             <a:r>
               <a:rPr lang="de-DE" dirty="0" smtClean="0"/>
-              <a:t>Benutzereingaben sind </a:t>
-            </a:r>
-            <a:r>
-              <a:rPr lang="de-DE" dirty="0" smtClean="0"/>
-              <a:t>zunächst </a:t>
-            </a:r>
-            <a:r>
-              <a:rPr lang="de-DE" dirty="0" smtClean="0"/>
-              <a:t>Text</a:t>
-            </a:r>
-            <a:endParaRPr lang="de-DE" dirty="0" smtClean="0"/>
+              <a:t>Benutzereingaben sind zunächst Text</a:t>
+            </a:r>
           </a:p>
           <a:p>
             <a:pPr lvl="1"/>
             <a:r>
               <a:rPr lang="de-DE" dirty="0" smtClean="0"/>
-              <a:t>Text </a:t>
-            </a:r>
-            <a:r>
-              <a:rPr lang="de-DE" dirty="0" smtClean="0"/>
-              <a:t>zu </a:t>
-            </a:r>
-            <a:r>
-              <a:rPr lang="de-DE" dirty="0" smtClean="0"/>
-              <a:t>Ganzzahl: </a:t>
-            </a:r>
-            <a:r>
-              <a:rPr lang="de-DE" sz="2800" b="1" dirty="0" err="1" smtClean="0">
+              <a:t>Text zu Ganzzahl: </a:t>
+            </a:r>
+            <a:r>
+              <a:rPr lang="de-DE" b="1" dirty="0" err="1" smtClean="0">
                 <a:solidFill>
                   <a:schemeClr val="accent1">
                     <a:lumMod val="75000"/>
@@ -15090,7 +14945,7 @@
               <a:t>int</a:t>
             </a:r>
             <a:r>
-              <a:rPr lang="de-DE" sz="2800" b="1" dirty="0" smtClean="0">
+              <a:rPr lang="de-DE" b="1" dirty="0" smtClean="0">
                 <a:solidFill>
                   <a:schemeClr val="accent1">
                     <a:lumMod val="75000"/>
@@ -15101,13 +14956,13 @@
               <a:t>(</a:t>
             </a:r>
             <a:r>
-              <a:rPr lang="de-DE" sz="2800" dirty="0" err="1" smtClean="0">
+              <a:rPr lang="de-DE" dirty="0" err="1" smtClean="0">
                 <a:ea typeface="+mj-ea"/>
               </a:rPr>
               <a:t>text</a:t>
             </a:r>
             <a:r>
-              <a:rPr lang="de-DE" sz="2800" b="1" dirty="0" smtClean="0">
+              <a:rPr lang="de-DE" b="1" dirty="0" smtClean="0">
                 <a:solidFill>
                   <a:schemeClr val="accent1">
                     <a:lumMod val="75000"/>
@@ -15117,14 +14972,6 @@
               </a:rPr>
               <a:t>)</a:t>
             </a:r>
-            <a:endParaRPr lang="de-DE" sz="2800" b="1" dirty="0" smtClean="0">
-              <a:solidFill>
-                <a:schemeClr val="accent1">
-                  <a:lumMod val="75000"/>
-                </a:schemeClr>
-              </a:solidFill>
-              <a:ea typeface="+mj-ea"/>
-            </a:endParaRPr>
           </a:p>
           <a:p>
             <a:pPr lvl="1"/>
@@ -15134,14 +14981,10 @@
             </a:r>
             <a:r>
               <a:rPr lang="de-DE" dirty="0" smtClean="0"/>
-              <a:t>zu </a:t>
-            </a:r>
-            <a:r>
-              <a:rPr lang="de-DE" dirty="0" smtClean="0"/>
-              <a:t>Kommazahl: </a:t>
-            </a:r>
-            <a:r>
-              <a:rPr lang="de-DE" sz="3200" b="1" dirty="0" err="1" smtClean="0">
+              <a:t>zu Kommazahl: </a:t>
+            </a:r>
+            <a:r>
+              <a:rPr lang="de-DE" b="1" dirty="0" err="1" smtClean="0">
                 <a:solidFill>
                   <a:schemeClr val="accent1">
                     <a:lumMod val="75000"/>
@@ -15151,7 +14994,7 @@
               <a:t>float</a:t>
             </a:r>
             <a:r>
-              <a:rPr lang="de-DE" sz="3200" b="1" dirty="0" smtClean="0">
+              <a:rPr lang="de-DE" b="1" dirty="0" smtClean="0">
                 <a:solidFill>
                   <a:schemeClr val="accent1">
                     <a:lumMod val="75000"/>
@@ -15161,11 +15004,11 @@
               <a:t>(</a:t>
             </a:r>
             <a:r>
-              <a:rPr lang="de-DE" sz="3200" dirty="0" err="1"/>
+              <a:rPr lang="de-DE" dirty="0" err="1"/>
               <a:t>text</a:t>
             </a:r>
             <a:r>
-              <a:rPr lang="de-DE" sz="3200" b="1" dirty="0" smtClean="0">
+              <a:rPr lang="de-DE" b="1" dirty="0" smtClean="0">
                 <a:solidFill>
                   <a:schemeClr val="accent1">
                     <a:lumMod val="75000"/>
@@ -15174,7 +15017,7 @@
               </a:rPr>
               <a:t>)</a:t>
             </a:r>
-            <a:endParaRPr lang="de-DE" sz="3200" b="1" dirty="0">
+            <a:endParaRPr lang="de-DE" b="1" dirty="0">
               <a:solidFill>
                 <a:schemeClr val="accent1">
                   <a:lumMod val="75000"/>
@@ -15197,7 +15040,7 @@
               <a:t>Text: </a:t>
             </a:r>
             <a:r>
-              <a:rPr lang="de-DE" sz="3200" b="1" dirty="0" err="1" smtClean="0">
+              <a:rPr lang="de-DE" b="1" dirty="0" err="1" smtClean="0">
                 <a:solidFill>
                   <a:schemeClr val="accent1">
                     <a:lumMod val="75000"/>
@@ -15207,7 +15050,7 @@
               <a:t>str</a:t>
             </a:r>
             <a:r>
-              <a:rPr lang="de-DE" sz="3200" b="1" dirty="0" smtClean="0">
+              <a:rPr lang="de-DE" b="1" dirty="0" smtClean="0">
                 <a:solidFill>
                   <a:schemeClr val="accent1">
                     <a:lumMod val="75000"/>
@@ -15217,11 +15060,11 @@
               <a:t>(</a:t>
             </a:r>
             <a:r>
-              <a:rPr lang="de-DE" sz="3200" dirty="0" smtClean="0"/>
+              <a:rPr lang="de-DE" dirty="0" smtClean="0"/>
               <a:t>zahl</a:t>
             </a:r>
             <a:r>
-              <a:rPr lang="de-DE" sz="3200" b="1" dirty="0" smtClean="0">
+              <a:rPr lang="de-DE" b="1" dirty="0" smtClean="0">
                 <a:solidFill>
                   <a:schemeClr val="accent1">
                     <a:lumMod val="75000"/>
@@ -15230,7 +15073,7 @@
               </a:rPr>
               <a:t>)</a:t>
             </a:r>
-            <a:endParaRPr lang="de-DE" sz="3200" b="1" dirty="0">
+            <a:endParaRPr lang="de-DE" b="1" dirty="0">
               <a:solidFill>
                 <a:schemeClr val="accent1">
                   <a:lumMod val="75000"/>
@@ -15268,7 +15111,7 @@
           <a:p>
             <a:fld id="{E6477017-8420-453C-A4F5-9874759FFB1C}" type="datetime1">
               <a:rPr lang="de-DE" smtClean="0"/>
-              <a:t>27.03.2018</a:t>
+              <a:t>07.09.2018</a:t>
             </a:fld>
             <a:endParaRPr lang="de-DE"/>
           </a:p>
@@ -15414,11 +15257,7 @@
           <a:p>
             <a:r>
               <a:rPr lang="de-DE" dirty="0" smtClean="0"/>
-              <a:t>Python </a:t>
-            </a:r>
-            <a:r>
-              <a:rPr lang="de-DE" dirty="0" smtClean="0"/>
-              <a:t>Grundlagen</a:t>
+              <a:t>Python Grundlagen</a:t>
             </a:r>
             <a:r>
               <a:rPr lang="de-DE" dirty="0"/>
@@ -15456,7 +15295,7 @@
           <a:p>
             <a:fld id="{8D936150-CEBE-4D0E-AA56-CD92215D4299}" type="datetime1">
               <a:rPr lang="de-DE" smtClean="0"/>
-              <a:t>27.03.2018</a:t>
+              <a:t>07.09.2018</a:t>
             </a:fld>
             <a:endParaRPr lang="de-DE"/>
           </a:p>
@@ -15684,11 +15523,7 @@
           <a:p>
             <a:r>
               <a:rPr lang="de-DE" dirty="0" smtClean="0"/>
-              <a:t>Python </a:t>
-            </a:r>
-            <a:r>
-              <a:rPr lang="de-DE" dirty="0" smtClean="0"/>
-              <a:t>Grundlagen</a:t>
+              <a:t>Python Grundlagen</a:t>
             </a:r>
             <a:r>
               <a:rPr lang="de-DE" dirty="0"/>
@@ -15764,15 +15599,7 @@
           <a:p>
             <a:r>
               <a:rPr lang="de-DE" dirty="0" smtClean="0"/>
-              <a:t>durch </a:t>
-            </a:r>
-            <a:r>
-              <a:rPr lang="de-DE" dirty="0" smtClean="0"/>
-              <a:t>Komma getrennte </a:t>
-            </a:r>
-            <a:r>
-              <a:rPr lang="de-DE" dirty="0" smtClean="0"/>
-              <a:t>Einträge: </a:t>
+              <a:t>durch Komma getrennte Einträge: </a:t>
             </a:r>
             <a:r>
               <a:rPr lang="de-DE" sz="3200" b="1" dirty="0">
@@ -15835,13 +15662,8 @@
           <a:p>
             <a:r>
               <a:rPr lang="de-DE" dirty="0" smtClean="0"/>
-              <a:t>Zerteilen wie bei </a:t>
-            </a:r>
-            <a:r>
-              <a:rPr lang="de-DE" dirty="0" smtClean="0"/>
-              <a:t>Text</a:t>
-            </a:r>
-            <a:endParaRPr lang="de-DE" dirty="0" smtClean="0"/>
+              <a:t>Zerteilen wie bei Text</a:t>
+            </a:r>
           </a:p>
           <a:p>
             <a:pPr lvl="1"/>
@@ -16004,7 +15826,7 @@
           <a:p>
             <a:fld id="{C251BD82-81F5-4AB8-95F1-D612B114E619}" type="datetime1">
               <a:rPr lang="de-DE" smtClean="0"/>
-              <a:t>27.03.2018</a:t>
+              <a:t>07.09.2018</a:t>
             </a:fld>
             <a:endParaRPr lang="de-DE"/>
           </a:p>
@@ -16161,11 +15983,7 @@
           <a:p>
             <a:r>
               <a:rPr lang="de-DE" dirty="0" smtClean="0"/>
-              <a:t>Python </a:t>
-            </a:r>
-            <a:r>
-              <a:rPr lang="de-DE" dirty="0" smtClean="0"/>
-              <a:t>Grundlagen</a:t>
+              <a:t>Python Grundlagen</a:t>
             </a:r>
             <a:r>
               <a:rPr lang="de-DE" dirty="0"/>
@@ -16213,7 +16031,7 @@
               <a:t>Aneinanderhängen von Listen mit </a:t>
             </a:r>
             <a:r>
-              <a:rPr lang="de-DE" b="1" dirty="0">
+              <a:rPr lang="de-DE" sz="2400" b="1" dirty="0">
                 <a:solidFill>
                   <a:schemeClr val="accent1">
                     <a:lumMod val="75000"/>
@@ -16226,14 +16044,10 @@
           <a:p>
             <a:r>
               <a:rPr lang="de-DE" dirty="0" smtClean="0"/>
-              <a:t>Vervielfachen </a:t>
-            </a:r>
-            <a:r>
-              <a:rPr lang="de-DE" dirty="0" smtClean="0"/>
-              <a:t>von Listen mit </a:t>
-            </a:r>
-            <a:r>
-              <a:rPr lang="de-DE" b="1" dirty="0">
+              <a:t>Vervielfachen von Listen mit </a:t>
+            </a:r>
+            <a:r>
+              <a:rPr lang="de-DE" sz="2400" b="1" dirty="0">
                 <a:solidFill>
                   <a:schemeClr val="accent1">
                     <a:lumMod val="75000"/>
@@ -16266,7 +16080,7 @@
           <a:p>
             <a:fld id="{ABE81AD2-829D-4072-9688-6B66C98C624B}" type="datetime1">
               <a:rPr lang="de-DE" smtClean="0"/>
-              <a:t>27.03.2018</a:t>
+              <a:t>07.09.2018</a:t>
             </a:fld>
             <a:endParaRPr lang="de-DE"/>
           </a:p>
@@ -16423,11 +16237,7 @@
           <a:p>
             <a:r>
               <a:rPr lang="de-DE" dirty="0" smtClean="0"/>
-              <a:t>Python </a:t>
-            </a:r>
-            <a:r>
-              <a:rPr lang="de-DE" dirty="0" smtClean="0"/>
-              <a:t>Grundlagen</a:t>
+              <a:t>Python Grundlagen</a:t>
             </a:r>
             <a:r>
               <a:rPr lang="de-DE" dirty="0"/>
@@ -16472,11 +16282,7 @@
           <a:p>
             <a:r>
               <a:rPr lang="de-DE" dirty="0" smtClean="0"/>
-              <a:t>Ändern</a:t>
-            </a:r>
-            <a:r>
-              <a:rPr lang="de-DE" dirty="0" smtClean="0"/>
-              <a:t>: einem Slice neue Werte zuweisen</a:t>
+              <a:t>Ändern: einem Slice neue Werte zuweisen</a:t>
             </a:r>
             <a:endParaRPr lang="de-DE" b="1" dirty="0">
               <a:solidFill>
@@ -16489,19 +16295,7 @@
           <a:p>
             <a:r>
               <a:rPr lang="de-DE" dirty="0" smtClean="0"/>
-              <a:t>Löschen</a:t>
-            </a:r>
-            <a:r>
-              <a:rPr lang="de-DE" dirty="0" smtClean="0"/>
-              <a:t>: einem Slice eine </a:t>
-            </a:r>
-            <a:r>
-              <a:rPr lang="de-DE" dirty="0" smtClean="0"/>
-              <a:t>leere </a:t>
-            </a:r>
-            <a:r>
-              <a:rPr lang="de-DE" dirty="0" smtClean="0"/>
-              <a:t>Liste zuweisen</a:t>
+              <a:t>Löschen: einem Slice eine leere Liste zuweisen</a:t>
             </a:r>
             <a:endParaRPr lang="de-DE" b="1" dirty="0">
               <a:solidFill>
@@ -16534,7 +16328,7 @@
           <a:p>
             <a:fld id="{6EF1BF9D-B1FC-41DE-A4C6-8332BF0AAB8C}" type="datetime1">
               <a:rPr lang="de-DE" smtClean="0"/>
-              <a:t>27.03.2018</a:t>
+              <a:t>07.09.2018</a:t>
             </a:fld>
             <a:endParaRPr lang="de-DE"/>
           </a:p>
@@ -16691,11 +16485,7 @@
           <a:p>
             <a:r>
               <a:rPr lang="de-DE" dirty="0" smtClean="0"/>
-              <a:t>Python </a:t>
-            </a:r>
-            <a:r>
-              <a:rPr lang="de-DE" dirty="0" smtClean="0"/>
-              <a:t>Grundlagen</a:t>
+              <a:t>Python Grundlagen</a:t>
             </a:r>
             <a:r>
               <a:rPr lang="de-DE" dirty="0"/>
@@ -16823,7 +16613,7 @@
           <a:p>
             <a:fld id="{108BF655-CA69-4CA1-8392-0482341FA3AB}" type="datetime1">
               <a:rPr lang="de-DE" smtClean="0"/>
-              <a:t>27.03.2018</a:t>
+              <a:t>07.09.2018</a:t>
             </a:fld>
             <a:endParaRPr lang="de-DE"/>
           </a:p>
@@ -16975,11 +16765,7 @@
           <a:p>
             <a:r>
               <a:rPr lang="de-DE" dirty="0" smtClean="0"/>
-              <a:t>Python </a:t>
-            </a:r>
-            <a:r>
-              <a:rPr lang="de-DE" dirty="0" smtClean="0"/>
-              <a:t>Grundlagen</a:t>
+              <a:t>Python Grundlagen</a:t>
             </a:r>
             <a:r>
               <a:rPr lang="de-DE" dirty="0"/>
@@ -17017,7 +16803,7 @@
           <a:p>
             <a:fld id="{06A903DF-1128-46CD-B417-38F6214F535A}" type="datetime1">
               <a:rPr lang="de-DE" smtClean="0"/>
-              <a:t>27.03.2018</a:t>
+              <a:t>07.09.2018</a:t>
             </a:fld>
             <a:endParaRPr lang="de-DE"/>
           </a:p>
@@ -17178,11 +16964,7 @@
           <a:p>
             <a:r>
               <a:rPr lang="de-DE" dirty="0" smtClean="0"/>
-              <a:t>Python </a:t>
-            </a:r>
-            <a:r>
-              <a:rPr lang="de-DE" dirty="0" smtClean="0"/>
-              <a:t>Grundlagen</a:t>
+              <a:t>Python Grundlagen</a:t>
             </a:r>
             <a:r>
               <a:rPr lang="de-DE" dirty="0"/>
@@ -17441,7 +17223,7 @@
           <a:p>
             <a:fld id="{540273FD-E4DC-432A-B7EC-710AF36B5BF9}" type="datetime1">
               <a:rPr lang="de-DE" smtClean="0"/>
-              <a:t>27.03.2018</a:t>
+              <a:t>07.09.2018</a:t>
             </a:fld>
             <a:endParaRPr lang="de-DE"/>
           </a:p>
@@ -17598,11 +17380,7 @@
           <a:p>
             <a:r>
               <a:rPr lang="de-DE" dirty="0" smtClean="0"/>
-              <a:t>Python </a:t>
-            </a:r>
-            <a:r>
-              <a:rPr lang="de-DE" dirty="0" smtClean="0"/>
-              <a:t>Grundlagen</a:t>
+              <a:t>Python Grundlagen</a:t>
             </a:r>
             <a:r>
               <a:rPr lang="de-DE" dirty="0"/>
@@ -17649,7 +17427,6 @@
               <a:rPr lang="de-DE" dirty="0" smtClean="0"/>
               <a:t>Operatoren</a:t>
             </a:r>
-            <a:endParaRPr lang="de-DE" dirty="0" smtClean="0"/>
           </a:p>
           <a:p>
             <a:pPr lvl="1"/>
@@ -17787,7 +17564,6 @@
               <a:rPr lang="de-DE" dirty="0"/>
               <a:t>Klammern möglich</a:t>
             </a:r>
-            <a:endParaRPr lang="de-DE" dirty="0"/>
           </a:p>
         </p:txBody>
       </p:sp>
@@ -17808,7 +17584,7 @@
           <a:p>
             <a:fld id="{F5A85240-7C7D-40AC-881C-FD470AC28E28}" type="datetime1">
               <a:rPr lang="de-DE" smtClean="0"/>
-              <a:t>27.03.2018</a:t>
+              <a:t>07.09.2018</a:t>
             </a:fld>
             <a:endParaRPr lang="de-DE"/>
           </a:p>
@@ -18090,7 +17866,7 @@
           <a:p>
             <a:fld id="{8E075C87-E077-4B9A-A783-FA839FDB07B3}" type="datetime1">
               <a:rPr lang="de-DE" smtClean="0"/>
-              <a:t>27.03.2018</a:t>
+              <a:t>07.09.2018</a:t>
             </a:fld>
             <a:endParaRPr lang="de-DE"/>
           </a:p>
@@ -18434,11 +18210,7 @@
           <a:p>
             <a:r>
               <a:rPr lang="de-DE" dirty="0" smtClean="0"/>
-              <a:t>Python </a:t>
-            </a:r>
-            <a:r>
-              <a:rPr lang="de-DE" dirty="0" smtClean="0"/>
-              <a:t>Grundlagen</a:t>
+              <a:t>Python Grundlagen</a:t>
             </a:r>
             <a:r>
               <a:rPr lang="de-DE" dirty="0"/>
@@ -18476,7 +18248,7 @@
           <a:p>
             <a:fld id="{DC06A4FB-3FEC-46DD-B898-227DF1300745}" type="datetime1">
               <a:rPr lang="de-DE" smtClean="0"/>
-              <a:t>27.03.2018</a:t>
+              <a:t>07.09.2018</a:t>
             </a:fld>
             <a:endParaRPr lang="de-DE"/>
           </a:p>
@@ -18658,11 +18430,7 @@
           <a:p>
             <a:r>
               <a:rPr lang="de-DE" dirty="0" smtClean="0"/>
-              <a:t>Python </a:t>
-            </a:r>
-            <a:r>
-              <a:rPr lang="de-DE" dirty="0" smtClean="0"/>
-              <a:t>Grundlagen</a:t>
+              <a:t>Python Grundlagen</a:t>
             </a:r>
             <a:r>
               <a:rPr lang="de-DE" dirty="0"/>
@@ -18754,11 +18522,7 @@
             <a:pPr lvl="1"/>
             <a:r>
               <a:rPr lang="de-DE" dirty="0" smtClean="0"/>
-              <a:t>Eingerückt </a:t>
-            </a:r>
-            <a:r>
-              <a:rPr lang="de-DE" dirty="0" smtClean="0"/>
-              <a:t>arbeiten</a:t>
+              <a:t>Eingerückt arbeiten</a:t>
             </a:r>
           </a:p>
           <a:p>
@@ -18787,7 +18551,7 @@
           <a:p>
             <a:fld id="{3B98499C-917A-4F26-B40E-695BD0FFC74B}" type="datetime1">
               <a:rPr lang="de-DE" smtClean="0"/>
-              <a:t>27.03.2018</a:t>
+              <a:t>07.09.2018</a:t>
             </a:fld>
             <a:endParaRPr lang="de-DE"/>
           </a:p>
@@ -18944,11 +18708,7 @@
           <a:p>
             <a:r>
               <a:rPr lang="de-DE" dirty="0" smtClean="0"/>
-              <a:t>Python </a:t>
-            </a:r>
-            <a:r>
-              <a:rPr lang="de-DE" dirty="0" smtClean="0"/>
-              <a:t>Grundlagen</a:t>
+              <a:t>Python Grundlagen</a:t>
             </a:r>
             <a:r>
               <a:rPr lang="de-DE" dirty="0"/>
@@ -19054,24 +18814,15 @@
             <a:pPr lvl="1"/>
             <a:r>
               <a:rPr lang="de-DE" dirty="0" smtClean="0"/>
-              <a:t>Eingerückt </a:t>
-            </a:r>
-            <a:r>
-              <a:rPr lang="de-DE" dirty="0" smtClean="0"/>
-              <a:t>arbeiten</a:t>
+              <a:t>Eingerückt arbeiten</a:t>
             </a:r>
           </a:p>
           <a:p>
             <a:pPr lvl="1"/>
             <a:r>
               <a:rPr lang="de-DE" dirty="0" smtClean="0"/>
-              <a:t>Am Ende nicht eingerückt </a:t>
-            </a:r>
-            <a:r>
-              <a:rPr lang="de-DE" dirty="0" smtClean="0"/>
-              <a:t>weiterarbeiten</a:t>
-            </a:r>
-            <a:endParaRPr lang="de-DE" dirty="0" smtClean="0"/>
+              <a:t>Am Ende nicht eingerückt weiterarbeiten</a:t>
+            </a:r>
           </a:p>
           <a:p>
             <a:pPr lvl="1"/>
@@ -19147,7 +18898,7 @@
           <a:p>
             <a:fld id="{5246C73B-41C6-44B0-8E99-FE85FF2BCCB2}" type="datetime1">
               <a:rPr lang="de-DE" smtClean="0"/>
-              <a:t>27.03.2018</a:t>
+              <a:t>07.09.2018</a:t>
             </a:fld>
             <a:endParaRPr lang="de-DE"/>
           </a:p>
@@ -19340,11 +19091,7 @@
           <a:p>
             <a:r>
               <a:rPr lang="de-DE" dirty="0" smtClean="0"/>
-              <a:t>Python </a:t>
-            </a:r>
-            <a:r>
-              <a:rPr lang="de-DE" dirty="0" smtClean="0"/>
-              <a:t>Grundlagen</a:t>
+              <a:t>Python Grundlagen</a:t>
             </a:r>
             <a:r>
               <a:rPr lang="de-DE" dirty="0"/>
@@ -19629,7 +19376,7 @@
           <a:p>
             <a:fld id="{49C6F141-7B96-497F-93A3-E688D5682946}" type="datetime1">
               <a:rPr lang="de-DE" smtClean="0"/>
-              <a:t>27.03.2018</a:t>
+              <a:t>07.09.2018</a:t>
             </a:fld>
             <a:endParaRPr lang="de-DE"/>
           </a:p>
@@ -19781,11 +19528,7 @@
           <a:p>
             <a:r>
               <a:rPr lang="de-DE" dirty="0" smtClean="0"/>
-              <a:t>Python </a:t>
-            </a:r>
-            <a:r>
-              <a:rPr lang="de-DE" dirty="0" smtClean="0"/>
-              <a:t>Grundlagen</a:t>
+              <a:t>Python Grundlagen</a:t>
             </a:r>
             <a:r>
               <a:rPr lang="de-DE" dirty="0"/>
@@ -19823,7 +19566,7 @@
           <a:p>
             <a:fld id="{1D88C1FA-871A-4A05-A6B3-E88443BF9D3D}" type="datetime1">
               <a:rPr lang="de-DE" smtClean="0"/>
-              <a:t>27.03.2018</a:t>
+              <a:t>07.09.2018</a:t>
             </a:fld>
             <a:endParaRPr lang="de-DE"/>
           </a:p>
@@ -20310,11 +20053,7 @@
           <a:p>
             <a:r>
               <a:rPr lang="de-DE" dirty="0" smtClean="0"/>
-              <a:t>Python </a:t>
-            </a:r>
-            <a:r>
-              <a:rPr lang="de-DE" dirty="0" smtClean="0"/>
-              <a:t>Grundlagen</a:t>
+              <a:t>Python Grundlagen</a:t>
             </a:r>
             <a:r>
               <a:rPr lang="de-DE" dirty="0"/>
@@ -20388,7 +20127,7 @@
           <a:p>
             <a:fld id="{2E0FAE72-4302-4067-A7B4-5361ED9C2922}" type="datetime1">
               <a:rPr lang="de-DE" smtClean="0"/>
-              <a:t>27.03.2018</a:t>
+              <a:t>07.09.2018</a:t>
             </a:fld>
             <a:endParaRPr lang="de-DE"/>
           </a:p>
@@ -20601,11 +20340,7 @@
           <a:p>
             <a:r>
               <a:rPr lang="de-DE" dirty="0" smtClean="0"/>
-              <a:t>Python </a:t>
-            </a:r>
-            <a:r>
-              <a:rPr lang="de-DE" dirty="0" smtClean="0"/>
-              <a:t>Grundlagen</a:t>
+              <a:t>Python Grundlagen</a:t>
             </a:r>
             <a:r>
               <a:rPr lang="de-DE" dirty="0"/>
@@ -20792,7 +20527,7 @@
           <a:p>
             <a:fld id="{BB9862A8-04CB-49F3-B3A2-15F0F5882BD1}" type="datetime1">
               <a:rPr lang="de-DE" smtClean="0"/>
-              <a:t>27.03.2018</a:t>
+              <a:t>07.09.2018</a:t>
             </a:fld>
             <a:endParaRPr lang="de-DE"/>
           </a:p>
@@ -20949,11 +20684,7 @@
           <a:p>
             <a:r>
               <a:rPr lang="de-DE" dirty="0" smtClean="0"/>
-              <a:t>Python </a:t>
-            </a:r>
-            <a:r>
-              <a:rPr lang="de-DE" dirty="0" smtClean="0"/>
-              <a:t>Grundlagen</a:t>
+              <a:t>Python Grundlagen</a:t>
             </a:r>
             <a:r>
               <a:rPr lang="de-DE" dirty="0"/>
@@ -21185,7 +20916,7 @@
           <a:p>
             <a:fld id="{793655B7-CBEA-457D-BD5B-ACC421B4D76A}" type="datetime1">
               <a:rPr lang="de-DE" smtClean="0"/>
-              <a:t>27.03.2018</a:t>
+              <a:t>07.09.2018</a:t>
             </a:fld>
             <a:endParaRPr lang="de-DE"/>
           </a:p>
@@ -21337,11 +21068,7 @@
           <a:p>
             <a:r>
               <a:rPr lang="de-DE" dirty="0" smtClean="0"/>
-              <a:t>Python </a:t>
-            </a:r>
-            <a:r>
-              <a:rPr lang="de-DE" dirty="0" smtClean="0"/>
-              <a:t>Grundlagen</a:t>
+              <a:t>Python Grundlagen</a:t>
             </a:r>
             <a:r>
               <a:rPr lang="de-DE" dirty="0"/>
@@ -21379,7 +21106,7 @@
           <a:p>
             <a:fld id="{FC061112-BDD9-4A67-BD62-58AEF83B3F31}" type="datetime1">
               <a:rPr lang="de-DE" smtClean="0"/>
-              <a:t>27.03.2018</a:t>
+              <a:t>07.09.2018</a:t>
             </a:fld>
             <a:endParaRPr lang="de-DE"/>
           </a:p>
@@ -21534,11 +21261,7 @@
           <a:p>
             <a:r>
               <a:rPr lang="de-DE" dirty="0" smtClean="0"/>
-              <a:t>Python </a:t>
-            </a:r>
-            <a:r>
-              <a:rPr lang="de-DE" dirty="0" smtClean="0"/>
-              <a:t>Grundlagen</a:t>
+              <a:t>Python Grundlagen</a:t>
             </a:r>
             <a:r>
               <a:rPr lang="de-DE" dirty="0"/>
@@ -21801,7 +21524,7 @@
           <a:p>
             <a:fld id="{3B41BE4B-80DE-4C35-9D51-52DD4B79173A}" type="datetime1">
               <a:rPr lang="de-DE" smtClean="0"/>
-              <a:t>27.03.2018</a:t>
+              <a:t>07.09.2018</a:t>
             </a:fld>
             <a:endParaRPr lang="de-DE"/>
           </a:p>
@@ -22026,7 +21749,7 @@
           <a:p>
             <a:fld id="{A6B8CC01-C994-4F6F-A4B1-704737F690FD}" type="datetime1">
               <a:rPr lang="de-DE" smtClean="0"/>
-              <a:t>27.03.2018</a:t>
+              <a:t>07.09.2018</a:t>
             </a:fld>
             <a:endParaRPr lang="de-DE"/>
           </a:p>
@@ -22375,11 +22098,7 @@
           <a:p>
             <a:r>
               <a:rPr lang="de-DE" dirty="0" smtClean="0"/>
-              <a:t>Python </a:t>
-            </a:r>
-            <a:r>
-              <a:rPr lang="de-DE" dirty="0" smtClean="0"/>
-              <a:t>Grundlagen</a:t>
+              <a:t>Python Grundlagen</a:t>
             </a:r>
             <a:r>
               <a:rPr lang="de-DE" dirty="0"/>
@@ -22724,7 +22443,7 @@
           <a:p>
             <a:fld id="{B5B31E73-7F2F-4C80-B0B3-B7B75D1A2D3F}" type="datetime1">
               <a:rPr lang="de-DE" smtClean="0"/>
-              <a:t>27.03.2018</a:t>
+              <a:t>07.09.2018</a:t>
             </a:fld>
             <a:endParaRPr lang="de-DE"/>
           </a:p>
@@ -22876,11 +22595,7 @@
           <a:p>
             <a:r>
               <a:rPr lang="de-DE" dirty="0" smtClean="0"/>
-              <a:t>Python </a:t>
-            </a:r>
-            <a:r>
-              <a:rPr lang="de-DE" dirty="0" smtClean="0"/>
-              <a:t>Grundlagen</a:t>
+              <a:t>Python Grundlagen</a:t>
             </a:r>
             <a:r>
               <a:rPr lang="de-DE" dirty="0"/>
@@ -22927,7 +22642,7 @@
           <a:p>
             <a:fld id="{BC49A95B-55CA-44C6-BB71-C8E504F09771}" type="datetime1">
               <a:rPr lang="de-DE" smtClean="0"/>
-              <a:t>27.03.2018</a:t>
+              <a:t>07.09.2018</a:t>
             </a:fld>
             <a:endParaRPr lang="de-DE"/>
           </a:p>
@@ -23331,11 +23046,7 @@
           <a:p>
             <a:r>
               <a:rPr lang="de-DE" dirty="0" smtClean="0"/>
-              <a:t>Erweitertes </a:t>
-            </a:r>
-            <a:r>
-              <a:rPr lang="de-DE" dirty="0" smtClean="0"/>
-              <a:t>Python</a:t>
+              <a:t>Erweitertes Python</a:t>
             </a:r>
             <a:r>
               <a:rPr lang="de-DE" dirty="0"/>
@@ -23389,21 +23100,13 @@
           <a:p>
             <a:r>
               <a:rPr lang="de-DE" dirty="0" smtClean="0"/>
-              <a:t>Mehrere </a:t>
-            </a:r>
-            <a:r>
-              <a:rPr lang="de-DE" dirty="0" smtClean="0"/>
-              <a:t>Werten, die zusammen gehören</a:t>
-            </a:r>
-          </a:p>
-          <a:p>
-            <a:r>
-              <a:rPr lang="de-DE" dirty="0" smtClean="0"/>
-              <a:t>Einpacken</a:t>
-            </a:r>
-            <a:r>
-              <a:rPr lang="de-DE" dirty="0" smtClean="0"/>
-              <a:t>: </a:t>
+              <a:t>Mehrere Werten, die zusammen gehören</a:t>
+            </a:r>
+          </a:p>
+          <a:p>
+            <a:r>
+              <a:rPr lang="de-DE" dirty="0" smtClean="0"/>
+              <a:t>Einpacken: </a:t>
             </a:r>
             <a:r>
               <a:rPr lang="de-DE" i="1" dirty="0" err="1">
@@ -23457,17 +23160,7 @@
                   </a:schemeClr>
                 </a:solidFill>
               </a:rPr>
-              <a:t> </a:t>
-            </a:r>
-            <a:r>
-              <a:rPr lang="de-DE" i="1" dirty="0" smtClean="0">
-                <a:solidFill>
-                  <a:schemeClr val="accent2">
-                    <a:lumMod val="75000"/>
-                  </a:schemeClr>
-                </a:solidFill>
-              </a:rPr>
-              <a:t>wert2</a:t>
+              <a:t> wert2</a:t>
             </a:r>
             <a:r>
               <a:rPr lang="de-DE" b="1" dirty="0" smtClean="0">
@@ -23575,7 +23268,7 @@
           <a:p>
             <a:fld id="{F7E50691-51A9-4140-A0EE-65B13D20BDB0}" type="datetime1">
               <a:rPr lang="de-DE" smtClean="0"/>
-              <a:t>27.03.2018</a:t>
+              <a:t>07.09.2018</a:t>
             </a:fld>
             <a:endParaRPr lang="de-DE"/>
           </a:p>
@@ -23726,11 +23419,7 @@
           <a:p>
             <a:r>
               <a:rPr lang="de-DE" dirty="0" smtClean="0"/>
-              <a:t>Erweitertes </a:t>
-            </a:r>
-            <a:r>
-              <a:rPr lang="de-DE" dirty="0" smtClean="0"/>
-              <a:t>Python</a:t>
+              <a:t>Erweitertes Python</a:t>
             </a:r>
             <a:r>
               <a:rPr lang="de-DE" dirty="0"/>
@@ -23794,7 +23483,6 @@
               <a:rPr lang="de-DE" dirty="0" smtClean="0"/>
               <a:t>“) können wie in der Mengenlehre verwendet werden</a:t>
             </a:r>
-            <a:endParaRPr lang="de-DE" dirty="0" smtClean="0"/>
           </a:p>
         </p:txBody>
       </p:sp>
@@ -23815,7 +23503,7 @@
           <a:p>
             <a:fld id="{4F38BD0A-546F-41BC-82E8-2F02A3E91B8C}" type="datetime1">
               <a:rPr lang="de-DE" smtClean="0"/>
-              <a:t>27.03.2018</a:t>
+              <a:t>07.09.2018</a:t>
             </a:fld>
             <a:endParaRPr lang="de-DE"/>
           </a:p>
@@ -23972,11 +23660,7 @@
           <a:p>
             <a:r>
               <a:rPr lang="de-DE" dirty="0" smtClean="0"/>
-              <a:t>Erweitertes </a:t>
-            </a:r>
-            <a:r>
-              <a:rPr lang="de-DE" dirty="0" smtClean="0"/>
-              <a:t>Python</a:t>
+              <a:t>Erweitertes Python</a:t>
             </a:r>
             <a:r>
               <a:rPr lang="de-DE" dirty="0"/>
@@ -24046,7 +23730,6 @@
               <a:rPr lang="de-DE" dirty="0" smtClean="0"/>
               <a:t>Name + Wert – Beziehung</a:t>
             </a:r>
-            <a:endParaRPr lang="de-DE" dirty="0" smtClean="0"/>
           </a:p>
           <a:p>
             <a:r>
@@ -24189,11 +23872,7 @@
             </a:br>
             <a:r>
               <a:rPr lang="de-DE" dirty="0" smtClean="0"/>
-              <a:t>gilt </a:t>
-            </a:r>
-            <a:r>
-              <a:rPr lang="de-DE" dirty="0" smtClean="0"/>
-              <a:t>für den Namen</a:t>
+              <a:t>gilt für den Namen</a:t>
             </a:r>
             <a:endParaRPr lang="de-DE" dirty="0"/>
           </a:p>
@@ -24220,7 +23899,7 @@
           <a:p>
             <a:fld id="{93BDE5D8-0EF8-43C8-A803-F2A4680D245A}" type="datetime1">
               <a:rPr lang="de-DE" smtClean="0"/>
-              <a:t>27.03.2018</a:t>
+              <a:t>07.09.2018</a:t>
             </a:fld>
             <a:endParaRPr lang="de-DE"/>
           </a:p>
@@ -24377,11 +24056,7 @@
           <a:p>
             <a:r>
               <a:rPr lang="de-DE" dirty="0" smtClean="0"/>
-              <a:t>Erweitertes </a:t>
-            </a:r>
-            <a:r>
-              <a:rPr lang="de-DE" dirty="0" smtClean="0"/>
-              <a:t>Python</a:t>
+              <a:t>Erweitertes Python</a:t>
             </a:r>
             <a:r>
               <a:rPr lang="de-DE" dirty="0"/>
@@ -24568,7 +24243,7 @@
           <a:p>
             <a:fld id="{8D8B82FA-64B0-40BF-B50C-04C47CA9AC1D}" type="datetime1">
               <a:rPr lang="de-DE" smtClean="0"/>
-              <a:t>27.03.2018</a:t>
+              <a:t>07.09.2018</a:t>
             </a:fld>
             <a:endParaRPr lang="de-DE"/>
           </a:p>
@@ -24725,11 +24400,7 @@
           <a:p>
             <a:r>
               <a:rPr lang="de-DE" dirty="0" smtClean="0"/>
-              <a:t>Erweitertes </a:t>
-            </a:r>
-            <a:r>
-              <a:rPr lang="de-DE" dirty="0" smtClean="0"/>
-              <a:t>Python</a:t>
+              <a:t>Erweitertes Python</a:t>
             </a:r>
             <a:r>
               <a:rPr lang="de-DE" dirty="0"/>
@@ -24908,7 +24579,7 @@
           <a:p>
             <a:fld id="{FE3EABC3-5E07-44ED-B9F0-0D657265B4EC}" type="datetime1">
               <a:rPr lang="de-DE" smtClean="0"/>
-              <a:t>27.03.2018</a:t>
+              <a:t>07.09.2018</a:t>
             </a:fld>
             <a:endParaRPr lang="de-DE"/>
           </a:p>
@@ -25159,7 +24830,7 @@
           <a:p>
             <a:fld id="{EB4AC1AA-53E0-448A-B2F2-C4EF9442D4CA}" type="datetime1">
               <a:rPr lang="de-DE" smtClean="0"/>
-              <a:t>27.03.2018</a:t>
+              <a:t>07.09.2018</a:t>
             </a:fld>
             <a:endParaRPr lang="de-DE"/>
           </a:p>
@@ -25712,7 +25383,7 @@
           <a:p>
             <a:fld id="{52E05894-614A-4FA2-8964-A13B04AD0751}" type="datetime1">
               <a:rPr lang="de-DE" smtClean="0"/>
-              <a:t>27.03.2018</a:t>
+              <a:t>07.09.2018</a:t>
             </a:fld>
             <a:endParaRPr lang="de-DE"/>
           </a:p>
@@ -25873,7 +25544,7 @@
           <a:p>
             <a:fld id="{ED3B93CF-AB26-4C9F-AAA0-3F7550F03D02}" type="datetime1">
               <a:rPr lang="de-DE" smtClean="0"/>
-              <a:t>27.03.2018</a:t>
+              <a:t>07.09.2018</a:t>
             </a:fld>
             <a:endParaRPr lang="de-DE"/>
           </a:p>
@@ -26151,7 +25822,7 @@
           <a:p>
             <a:fld id="{892083D9-D1FB-4795-8ED9-565B4526F86A}" type="datetime1">
               <a:rPr lang="de-DE" smtClean="0"/>
-              <a:t>27.03.2018</a:t>
+              <a:t>07.09.2018</a:t>
             </a:fld>
             <a:endParaRPr lang="de-DE"/>
           </a:p>
@@ -26420,7 +26091,7 @@
           <a:p>
             <a:fld id="{F67820BC-C8FF-45AD-B49D-D36E11B23538}" type="datetime1">
               <a:rPr lang="de-DE" smtClean="0"/>
-              <a:t>27.03.2018</a:t>
+              <a:t>07.09.2018</a:t>
             </a:fld>
             <a:endParaRPr lang="de-DE"/>
           </a:p>
@@ -26604,11 +26275,7 @@
             <a:pPr lvl="1"/>
             <a:r>
               <a:rPr lang="de-DE" dirty="0" smtClean="0"/>
-              <a:t>Name </a:t>
-            </a:r>
-            <a:r>
-              <a:rPr lang="de-DE" dirty="0" smtClean="0"/>
-              <a:t>stammt von Monty Python</a:t>
+              <a:t>Name stammt von Monty Python</a:t>
             </a:r>
           </a:p>
         </p:txBody>
@@ -26630,7 +26297,7 @@
           <a:p>
             <a:fld id="{5B0789DE-66C1-462D-B123-D68992F3079E}" type="datetime1">
               <a:rPr lang="de-DE" smtClean="0"/>
-              <a:t>27.03.2018</a:t>
+              <a:t>07.09.2018</a:t>
             </a:fld>
             <a:endParaRPr lang="de-DE"/>
           </a:p>
@@ -26793,152 +26460,7 @@
   <p:timing>
     <p:tnLst>
       <p:par>
-        <p:cTn id="1" dur="indefinite" restart="never" nodeType="tmRoot">
-          <p:childTnLst>
-            <p:seq concurrent="1" nextAc="seek">
-              <p:cTn id="2" dur="indefinite" nodeType="mainSeq">
-                <p:childTnLst>
-                  <p:par>
-                    <p:cTn id="3" fill="hold">
-                      <p:stCondLst>
-                        <p:cond delay="indefinite"/>
-                      </p:stCondLst>
-                      <p:childTnLst>
-                        <p:par>
-                          <p:cTn id="4" fill="hold">
-                            <p:stCondLst>
-                              <p:cond delay="0"/>
-                            </p:stCondLst>
-                            <p:childTnLst>
-                              <p:par>
-                                <p:cTn id="5" presetID="10" presetClass="entr" presetSubtype="0" fill="hold" nodeType="clickEffect">
-                                  <p:stCondLst>
-                                    <p:cond delay="0"/>
-                                  </p:stCondLst>
-                                  <p:childTnLst>
-                                    <p:set>
-                                      <p:cBhvr>
-                                        <p:cTn id="6" dur="1" fill="hold">
-                                          <p:stCondLst>
-                                            <p:cond delay="0"/>
-                                          </p:stCondLst>
-                                        </p:cTn>
-                                        <p:tgtEl>
-                                          <p:spTgt spid="3">
-                                            <p:txEl>
-                                              <p:pRg st="1" end="1"/>
-                                            </p:txEl>
-                                          </p:spTgt>
-                                        </p:tgtEl>
-                                        <p:attrNameLst>
-                                          <p:attrName>style.visibility</p:attrName>
-                                        </p:attrNameLst>
-                                      </p:cBhvr>
-                                      <p:to>
-                                        <p:strVal val="visible"/>
-                                      </p:to>
-                                    </p:set>
-                                    <p:animEffect transition="in" filter="fade">
-                                      <p:cBhvr>
-                                        <p:cTn id="7" dur="500"/>
-                                        <p:tgtEl>
-                                          <p:spTgt spid="3">
-                                            <p:txEl>
-                                              <p:pRg st="1" end="1"/>
-                                            </p:txEl>
-                                          </p:spTgt>
-                                        </p:tgtEl>
-                                      </p:cBhvr>
-                                    </p:animEffect>
-                                  </p:childTnLst>
-                                </p:cTn>
-                              </p:par>
-                            </p:childTnLst>
-                          </p:cTn>
-                        </p:par>
-                      </p:childTnLst>
-                    </p:cTn>
-                  </p:par>
-                  <p:par>
-                    <p:cTn id="8" fill="hold">
-                      <p:stCondLst>
-                        <p:cond delay="indefinite"/>
-                      </p:stCondLst>
-                      <p:childTnLst>
-                        <p:par>
-                          <p:cTn id="9" fill="hold">
-                            <p:stCondLst>
-                              <p:cond delay="0"/>
-                            </p:stCondLst>
-                            <p:childTnLst>
-                              <p:par>
-                                <p:cTn id="10" presetID="10" presetClass="entr" presetSubtype="0" fill="hold" nodeType="clickEffect">
-                                  <p:stCondLst>
-                                    <p:cond delay="0"/>
-                                  </p:stCondLst>
-                                  <p:childTnLst>
-                                    <p:set>
-                                      <p:cBhvr>
-                                        <p:cTn id="11" dur="1" fill="hold">
-                                          <p:stCondLst>
-                                            <p:cond delay="0"/>
-                                          </p:stCondLst>
-                                        </p:cTn>
-                                        <p:tgtEl>
-                                          <p:spTgt spid="3">
-                                            <p:txEl>
-                                              <p:pRg st="2" end="2"/>
-                                            </p:txEl>
-                                          </p:spTgt>
-                                        </p:tgtEl>
-                                        <p:attrNameLst>
-                                          <p:attrName>style.visibility</p:attrName>
-                                        </p:attrNameLst>
-                                      </p:cBhvr>
-                                      <p:to>
-                                        <p:strVal val="visible"/>
-                                      </p:to>
-                                    </p:set>
-                                    <p:animEffect transition="in" filter="fade">
-                                      <p:cBhvr>
-                                        <p:cTn id="12" dur="500"/>
-                                        <p:tgtEl>
-                                          <p:spTgt spid="3">
-                                            <p:txEl>
-                                              <p:pRg st="2" end="2"/>
-                                            </p:txEl>
-                                          </p:spTgt>
-                                        </p:tgtEl>
-                                      </p:cBhvr>
-                                    </p:animEffect>
-                                  </p:childTnLst>
-                                </p:cTn>
-                              </p:par>
-                            </p:childTnLst>
-                          </p:cTn>
-                        </p:par>
-                      </p:childTnLst>
-                    </p:cTn>
-                  </p:par>
-                </p:childTnLst>
-              </p:cTn>
-              <p:prevCondLst>
-                <p:cond evt="onPrev" delay="0">
-                  <p:tgtEl>
-                    <p:sldTgt/>
-                  </p:tgtEl>
-                </p:cond>
-              </p:prevCondLst>
-              <p:nextCondLst>
-                <p:cond evt="onNext" delay="0">
-                  <p:tgtEl>
-                    <p:sldTgt/>
-                  </p:tgtEl>
-                </p:cond>
-              </p:nextCondLst>
-            </p:seq>
-          </p:childTnLst>
-        </p:cTn>
+        <p:cTn id="1" dur="indefinite" restart="never" nodeType="tmRoot"/>
       </p:par>
     </p:tnLst>
   </p:timing>
@@ -27057,7 +26579,7 @@
           <a:p>
             <a:fld id="{9D3752BF-127A-43A1-9997-CD734D7352E5}" type="datetime1">
               <a:rPr lang="de-DE" smtClean="0"/>
-              <a:t>27.03.2018</a:t>
+              <a:t>07.09.2018</a:t>
             </a:fld>
             <a:endParaRPr lang="de-DE"/>
           </a:p>

</xml_diff>